<commit_message>
Fix logo in README file image and presentation file
</commit_message>
<xml_diff>
--- a/E-commerce_Presentation.pptx
+++ b/E-commerce_Presentation.pptx
@@ -207,7 +207,7 @@
           <a:p>
             <a:fld id="{D4365C11-C22B-4E73-BA02-6E82495EF0DB}" type="datetimeFigureOut">
               <a:rPr lang="en-US" smtClean="0"/>
-              <a:t>12/8/2023</a:t>
+              <a:t>12/9/2023</a:t>
             </a:fld>
             <a:endParaRPr lang="en-US"/>
           </a:p>
@@ -621,7 +621,7 @@
           <a:p>
             <a:fld id="{F72D7134-1611-4EAD-B11D-B2AF89BF2437}" type="datetimeFigureOut">
               <a:rPr lang="en-US" smtClean="0"/>
-              <a:t>12/8/2023</a:t>
+              <a:t>12/9/2023</a:t>
             </a:fld>
             <a:endParaRPr lang="en-US"/>
           </a:p>
@@ -819,7 +819,7 @@
           <a:p>
             <a:fld id="{F72D7134-1611-4EAD-B11D-B2AF89BF2437}" type="datetimeFigureOut">
               <a:rPr lang="en-US" smtClean="0"/>
-              <a:t>12/8/2023</a:t>
+              <a:t>12/9/2023</a:t>
             </a:fld>
             <a:endParaRPr lang="en-US"/>
           </a:p>
@@ -1027,7 +1027,7 @@
           <a:p>
             <a:fld id="{F72D7134-1611-4EAD-B11D-B2AF89BF2437}" type="datetimeFigureOut">
               <a:rPr lang="en-US" smtClean="0"/>
-              <a:t>12/8/2023</a:t>
+              <a:t>12/9/2023</a:t>
             </a:fld>
             <a:endParaRPr lang="en-US"/>
           </a:p>
@@ -1225,7 +1225,7 @@
           <a:p>
             <a:fld id="{F72D7134-1611-4EAD-B11D-B2AF89BF2437}" type="datetimeFigureOut">
               <a:rPr lang="en-US" smtClean="0"/>
-              <a:t>12/8/2023</a:t>
+              <a:t>12/9/2023</a:t>
             </a:fld>
             <a:endParaRPr lang="en-US"/>
           </a:p>
@@ -1500,7 +1500,7 @@
           <a:p>
             <a:fld id="{F72D7134-1611-4EAD-B11D-B2AF89BF2437}" type="datetimeFigureOut">
               <a:rPr lang="en-US" smtClean="0"/>
-              <a:t>12/8/2023</a:t>
+              <a:t>12/9/2023</a:t>
             </a:fld>
             <a:endParaRPr lang="en-US"/>
           </a:p>
@@ -1765,7 +1765,7 @@
           <a:p>
             <a:fld id="{F72D7134-1611-4EAD-B11D-B2AF89BF2437}" type="datetimeFigureOut">
               <a:rPr lang="en-US" smtClean="0"/>
-              <a:t>12/8/2023</a:t>
+              <a:t>12/9/2023</a:t>
             </a:fld>
             <a:endParaRPr lang="en-US"/>
           </a:p>
@@ -2177,7 +2177,7 @@
           <a:p>
             <a:fld id="{F72D7134-1611-4EAD-B11D-B2AF89BF2437}" type="datetimeFigureOut">
               <a:rPr lang="en-US" smtClean="0"/>
-              <a:t>12/8/2023</a:t>
+              <a:t>12/9/2023</a:t>
             </a:fld>
             <a:endParaRPr lang="en-US"/>
           </a:p>
@@ -2318,7 +2318,7 @@
           <a:p>
             <a:fld id="{F72D7134-1611-4EAD-B11D-B2AF89BF2437}" type="datetimeFigureOut">
               <a:rPr lang="en-US" smtClean="0"/>
-              <a:t>12/8/2023</a:t>
+              <a:t>12/9/2023</a:t>
             </a:fld>
             <a:endParaRPr lang="en-US"/>
           </a:p>
@@ -2431,7 +2431,7 @@
           <a:p>
             <a:fld id="{F72D7134-1611-4EAD-B11D-B2AF89BF2437}" type="datetimeFigureOut">
               <a:rPr lang="en-US" smtClean="0"/>
-              <a:t>12/8/2023</a:t>
+              <a:t>12/9/2023</a:t>
             </a:fld>
             <a:endParaRPr lang="en-US"/>
           </a:p>
@@ -2742,7 +2742,7 @@
           <a:p>
             <a:fld id="{F72D7134-1611-4EAD-B11D-B2AF89BF2437}" type="datetimeFigureOut">
               <a:rPr lang="en-US" smtClean="0"/>
-              <a:t>12/8/2023</a:t>
+              <a:t>12/9/2023</a:t>
             </a:fld>
             <a:endParaRPr lang="en-US"/>
           </a:p>
@@ -3030,7 +3030,7 @@
           <a:p>
             <a:fld id="{F72D7134-1611-4EAD-B11D-B2AF89BF2437}" type="datetimeFigureOut">
               <a:rPr lang="en-US" smtClean="0"/>
-              <a:t>12/8/2023</a:t>
+              <a:t>12/9/2023</a:t>
             </a:fld>
             <a:endParaRPr lang="en-US"/>
           </a:p>
@@ -3271,7 +3271,7 @@
           <a:p>
             <a:fld id="{F72D7134-1611-4EAD-B11D-B2AF89BF2437}" type="datetimeFigureOut">
               <a:rPr lang="en-US" smtClean="0"/>
-              <a:t>12/8/2023</a:t>
+              <a:t>12/9/2023</a:t>
             </a:fld>
             <a:endParaRPr lang="en-US"/>
           </a:p>
@@ -5641,10 +5641,10 @@
       </p:grpSpPr>
       <p:pic>
         <p:nvPicPr>
-          <p:cNvPr id="4" name="Picture 3">
+          <p:cNvPr id="3" name="Picture 2">
             <a:extLst>
               <a:ext uri="{FF2B5EF4-FFF2-40B4-BE49-F238E27FC236}">
-                <a16:creationId xmlns:a16="http://schemas.microsoft.com/office/drawing/2014/main" id="{33A629DA-5447-F14A-1649-AC7AA373647A}"/>
+                <a16:creationId xmlns:a16="http://schemas.microsoft.com/office/drawing/2014/main" id="{AF112675-0A36-9233-A9CB-2CA577B20B3E}"/>
               </a:ext>
             </a:extLst>
           </p:cNvPr>
@@ -6248,56 +6248,6 @@
           <a:chExt cx="0" cy="0"/>
         </a:xfrm>
       </p:grpSpPr>
-      <p:sp>
-        <p:nvSpPr>
-          <p:cNvPr id="2" name="Rectangle 1">
-            <a:extLst>
-              <a:ext uri="{FF2B5EF4-FFF2-40B4-BE49-F238E27FC236}">
-                <a16:creationId xmlns:a16="http://schemas.microsoft.com/office/drawing/2014/main" id="{3D8D90D8-042E-4CF9-5789-EDEB831FF41C}"/>
-              </a:ext>
-            </a:extLst>
-          </p:cNvPr>
-          <p:cNvSpPr/>
-          <p:nvPr/>
-        </p:nvSpPr>
-        <p:spPr>
-          <a:xfrm>
-            <a:off x="6055301" y="0"/>
-            <a:ext cx="6136699" cy="6858000"/>
-          </a:xfrm>
-          <a:prstGeom prst="rect">
-            <a:avLst/>
-          </a:prstGeom>
-        </p:spPr>
-        <p:style>
-          <a:lnRef idx="2">
-            <a:schemeClr val="accent1">
-              <a:shade val="15000"/>
-            </a:schemeClr>
-          </a:lnRef>
-          <a:fillRef idx="1">
-            <a:schemeClr val="accent1"/>
-          </a:fillRef>
-          <a:effectRef idx="0">
-            <a:schemeClr val="accent1"/>
-          </a:effectRef>
-          <a:fontRef idx="minor">
-            <a:schemeClr val="lt1"/>
-          </a:fontRef>
-        </p:style>
-        <p:txBody>
-          <a:bodyPr rtlCol="0" anchor="ctr"/>
-          <a:lstStyle/>
-          <a:p>
-            <a:pPr algn="ctr"/>
-            <a:endParaRPr lang="en-US">
-              <a:latin typeface="Tahoma" panose="020B0604030504040204" pitchFamily="34" charset="0"/>
-              <a:ea typeface="Tahoma" panose="020B0604030504040204" pitchFamily="34" charset="0"/>
-              <a:cs typeface="Tahoma" panose="020B0604030504040204" pitchFamily="34" charset="0"/>
-            </a:endParaRPr>
-          </a:p>
-        </p:txBody>
-      </p:sp>
       <p:grpSp>
         <p:nvGrpSpPr>
           <p:cNvPr id="7" name="Group 6">
@@ -6460,66 +6410,196 @@
           </a:prstGeom>
         </p:spPr>
       </p:pic>
-      <p:pic>
-        <p:nvPicPr>
-          <p:cNvPr id="11" name="Picture 10">
+      <p:grpSp>
+        <p:nvGrpSpPr>
+          <p:cNvPr id="12" name="Group 11">
             <a:extLst>
               <a:ext uri="{FF2B5EF4-FFF2-40B4-BE49-F238E27FC236}">
-                <a16:creationId xmlns:a16="http://schemas.microsoft.com/office/drawing/2014/main" id="{64F3412E-F7C9-C639-0ED6-1E46440525F7}"/>
+                <a16:creationId xmlns:a16="http://schemas.microsoft.com/office/drawing/2014/main" id="{D802A4F1-29CE-0A77-5041-10619696FB4A}"/>
               </a:ext>
             </a:extLst>
           </p:cNvPr>
-          <p:cNvPicPr>
-            <a:picLocks noChangeAspect="1"/>
-          </p:cNvPicPr>
+          <p:cNvGrpSpPr/>
           <p:nvPr/>
-        </p:nvPicPr>
-        <p:blipFill>
-          <a:blip r:embed="rId3"/>
-          <a:stretch>
-            <a:fillRect/>
-          </a:stretch>
-        </p:blipFill>
-        <p:spPr>
+        </p:nvGrpSpPr>
+        <p:grpSpPr>
           <a:xfrm>
-            <a:off x="6055302" y="0"/>
-            <a:ext cx="6136698" cy="3296181"/>
+            <a:off x="6055300" y="-12699"/>
+            <a:ext cx="6141462" cy="6870699"/>
+            <a:chOff x="6055300" y="-12699"/>
+            <a:chExt cx="6141462" cy="6870699"/>
           </a:xfrm>
-          <a:prstGeom prst="rect">
-            <a:avLst/>
-          </a:prstGeom>
-        </p:spPr>
-      </p:pic>
-      <p:pic>
-        <p:nvPicPr>
-          <p:cNvPr id="13" name="Picture 12">
-            <a:extLst>
-              <a:ext uri="{FF2B5EF4-FFF2-40B4-BE49-F238E27FC236}">
-                <a16:creationId xmlns:a16="http://schemas.microsoft.com/office/drawing/2014/main" id="{4A8DC541-A25E-AA8D-BD7D-EB517DCC8B39}"/>
-              </a:ext>
-            </a:extLst>
-          </p:cNvPr>
-          <p:cNvPicPr>
-            <a:picLocks noChangeAspect="1"/>
-          </p:cNvPicPr>
-          <p:nvPr/>
-        </p:nvPicPr>
-        <p:blipFill>
-          <a:blip r:embed="rId4"/>
-          <a:stretch>
-            <a:fillRect/>
-          </a:stretch>
-        </p:blipFill>
-        <p:spPr>
-          <a:xfrm>
-            <a:off x="6055300" y="3188368"/>
-            <a:ext cx="6136700" cy="3643096"/>
-          </a:xfrm>
-          <a:prstGeom prst="rect">
-            <a:avLst/>
-          </a:prstGeom>
-        </p:spPr>
-      </p:pic>
+        </p:grpSpPr>
+        <p:sp>
+          <p:nvSpPr>
+            <p:cNvPr id="2" name="Rectangle 1">
+              <a:extLst>
+                <a:ext uri="{FF2B5EF4-FFF2-40B4-BE49-F238E27FC236}">
+                  <a16:creationId xmlns:a16="http://schemas.microsoft.com/office/drawing/2014/main" id="{3D8D90D8-042E-4CF9-5789-EDEB831FF41C}"/>
+                </a:ext>
+              </a:extLst>
+            </p:cNvPr>
+            <p:cNvSpPr/>
+            <p:nvPr/>
+          </p:nvSpPr>
+          <p:spPr>
+            <a:xfrm>
+              <a:off x="6055301" y="0"/>
+              <a:ext cx="6136699" cy="6858000"/>
+            </a:xfrm>
+            <a:prstGeom prst="rect">
+              <a:avLst/>
+            </a:prstGeom>
+          </p:spPr>
+          <p:style>
+            <a:lnRef idx="2">
+              <a:schemeClr val="accent1">
+                <a:shade val="15000"/>
+              </a:schemeClr>
+            </a:lnRef>
+            <a:fillRef idx="1">
+              <a:schemeClr val="accent1"/>
+            </a:fillRef>
+            <a:effectRef idx="0">
+              <a:schemeClr val="accent1"/>
+            </a:effectRef>
+            <a:fontRef idx="minor">
+              <a:schemeClr val="lt1"/>
+            </a:fontRef>
+          </p:style>
+          <p:txBody>
+            <a:bodyPr rtlCol="0" anchor="ctr"/>
+            <a:lstStyle/>
+            <a:p>
+              <a:pPr algn="ctr"/>
+              <a:endParaRPr lang="en-US">
+                <a:latin typeface="Tahoma" panose="020B0604030504040204" pitchFamily="34" charset="0"/>
+                <a:ea typeface="Tahoma" panose="020B0604030504040204" pitchFamily="34" charset="0"/>
+                <a:cs typeface="Tahoma" panose="020B0604030504040204" pitchFamily="34" charset="0"/>
+              </a:endParaRPr>
+            </a:p>
+          </p:txBody>
+        </p:sp>
+        <p:pic>
+          <p:nvPicPr>
+            <p:cNvPr id="11" name="Picture 10">
+              <a:extLst>
+                <a:ext uri="{FF2B5EF4-FFF2-40B4-BE49-F238E27FC236}">
+                  <a16:creationId xmlns:a16="http://schemas.microsoft.com/office/drawing/2014/main" id="{64F3412E-F7C9-C639-0ED6-1E46440525F7}"/>
+                </a:ext>
+              </a:extLst>
+            </p:cNvPr>
+            <p:cNvPicPr>
+              <a:picLocks noChangeAspect="1"/>
+            </p:cNvPicPr>
+            <p:nvPr/>
+          </p:nvPicPr>
+          <p:blipFill>
+            <a:blip r:embed="rId3"/>
+            <a:stretch>
+              <a:fillRect/>
+            </a:stretch>
+          </p:blipFill>
+          <p:spPr>
+            <a:xfrm>
+              <a:off x="6055302" y="0"/>
+              <a:ext cx="6136698" cy="3296181"/>
+            </a:xfrm>
+            <a:prstGeom prst="rect">
+              <a:avLst/>
+            </a:prstGeom>
+          </p:spPr>
+        </p:pic>
+        <p:pic>
+          <p:nvPicPr>
+            <p:cNvPr id="13" name="Picture 12">
+              <a:extLst>
+                <a:ext uri="{FF2B5EF4-FFF2-40B4-BE49-F238E27FC236}">
+                  <a16:creationId xmlns:a16="http://schemas.microsoft.com/office/drawing/2014/main" id="{4A8DC541-A25E-AA8D-BD7D-EB517DCC8B39}"/>
+                </a:ext>
+              </a:extLst>
+            </p:cNvPr>
+            <p:cNvPicPr>
+              <a:picLocks noChangeAspect="1"/>
+            </p:cNvPicPr>
+            <p:nvPr/>
+          </p:nvPicPr>
+          <p:blipFill>
+            <a:blip r:embed="rId4"/>
+            <a:stretch>
+              <a:fillRect/>
+            </a:stretch>
+          </p:blipFill>
+          <p:spPr>
+            <a:xfrm>
+              <a:off x="6055300" y="3188368"/>
+              <a:ext cx="6136700" cy="3643096"/>
+            </a:xfrm>
+            <a:prstGeom prst="rect">
+              <a:avLst/>
+            </a:prstGeom>
+          </p:spPr>
+        </p:pic>
+        <p:pic>
+          <p:nvPicPr>
+            <p:cNvPr id="5" name="Picture 4">
+              <a:extLst>
+                <a:ext uri="{FF2B5EF4-FFF2-40B4-BE49-F238E27FC236}">
+                  <a16:creationId xmlns:a16="http://schemas.microsoft.com/office/drawing/2014/main" id="{AEA430DD-3743-C808-E3EE-4DE7124C38B5}"/>
+                </a:ext>
+              </a:extLst>
+            </p:cNvPr>
+            <p:cNvPicPr>
+              <a:picLocks noChangeAspect="1"/>
+            </p:cNvPicPr>
+            <p:nvPr/>
+          </p:nvPicPr>
+          <p:blipFill>
+            <a:blip r:embed="rId5"/>
+            <a:stretch>
+              <a:fillRect/>
+            </a:stretch>
+          </p:blipFill>
+          <p:spPr>
+            <a:xfrm>
+              <a:off x="6060062" y="-12699"/>
+              <a:ext cx="6136700" cy="388978"/>
+            </a:xfrm>
+            <a:prstGeom prst="rect">
+              <a:avLst/>
+            </a:prstGeom>
+          </p:spPr>
+        </p:pic>
+        <p:pic>
+          <p:nvPicPr>
+            <p:cNvPr id="10" name="Picture 9">
+              <a:extLst>
+                <a:ext uri="{FF2B5EF4-FFF2-40B4-BE49-F238E27FC236}">
+                  <a16:creationId xmlns:a16="http://schemas.microsoft.com/office/drawing/2014/main" id="{6E78AC73-0C41-F981-9784-B98DFC608055}"/>
+                </a:ext>
+              </a:extLst>
+            </p:cNvPr>
+            <p:cNvPicPr>
+              <a:picLocks noChangeAspect="1"/>
+            </p:cNvPicPr>
+            <p:nvPr/>
+          </p:nvPicPr>
+          <p:blipFill rotWithShape="1">
+            <a:blip r:embed="rId6"/>
+            <a:srcRect r="78"/>
+            <a:stretch/>
+          </p:blipFill>
+          <p:spPr>
+            <a:xfrm>
+              <a:off x="6060064" y="6467464"/>
+              <a:ext cx="6136698" cy="390444"/>
+            </a:xfrm>
+            <a:prstGeom prst="rect">
+              <a:avLst/>
+            </a:prstGeom>
+          </p:spPr>
+        </p:pic>
+      </p:grpSp>
     </p:spTree>
     <p:extLst>
       <p:ext uri="{BB962C8B-B14F-4D97-AF65-F5344CB8AC3E}">

</xml_diff>